<commit_message>
Specific use case final ( without corrections)
</commit_message>
<xml_diff>
--- a/documentation/docTravail/seancesTravail/Role4All_use_case/syncro.pptx
+++ b/documentation/docTravail/seancesTravail/Role4All_use_case/syncro.pptx
@@ -288,7 +288,7 @@
           <a:p>
             <a:fld id="{B22306D6-51C5-4B5A-8820-C27038D71A33}" type="datetimeFigureOut">
               <a:rPr lang="en-US" smtClean="0"/>
-              <a:t>1/12/2016</a:t>
+              <a:t>1/13/2016</a:t>
             </a:fld>
             <a:endParaRPr lang="en-US"/>
           </a:p>
@@ -458,7 +458,7 @@
           <a:p>
             <a:fld id="{B22306D6-51C5-4B5A-8820-C27038D71A33}" type="datetimeFigureOut">
               <a:rPr lang="en-US" smtClean="0"/>
-              <a:t>1/12/2016</a:t>
+              <a:t>1/13/2016</a:t>
             </a:fld>
             <a:endParaRPr lang="en-US"/>
           </a:p>
@@ -638,7 +638,7 @@
           <a:p>
             <a:fld id="{B22306D6-51C5-4B5A-8820-C27038D71A33}" type="datetimeFigureOut">
               <a:rPr lang="en-US" smtClean="0"/>
-              <a:t>1/12/2016</a:t>
+              <a:t>1/13/2016</a:t>
             </a:fld>
             <a:endParaRPr lang="en-US"/>
           </a:p>
@@ -808,7 +808,7 @@
           <a:p>
             <a:fld id="{B22306D6-51C5-4B5A-8820-C27038D71A33}" type="datetimeFigureOut">
               <a:rPr lang="en-US" smtClean="0"/>
-              <a:t>1/12/2016</a:t>
+              <a:t>1/13/2016</a:t>
             </a:fld>
             <a:endParaRPr lang="en-US"/>
           </a:p>
@@ -1054,7 +1054,7 @@
           <a:p>
             <a:fld id="{B22306D6-51C5-4B5A-8820-C27038D71A33}" type="datetimeFigureOut">
               <a:rPr lang="en-US" smtClean="0"/>
-              <a:t>1/12/2016</a:t>
+              <a:t>1/13/2016</a:t>
             </a:fld>
             <a:endParaRPr lang="en-US"/>
           </a:p>
@@ -1342,7 +1342,7 @@
           <a:p>
             <a:fld id="{B22306D6-51C5-4B5A-8820-C27038D71A33}" type="datetimeFigureOut">
               <a:rPr lang="en-US" smtClean="0"/>
-              <a:t>1/12/2016</a:t>
+              <a:t>1/13/2016</a:t>
             </a:fld>
             <a:endParaRPr lang="en-US"/>
           </a:p>
@@ -1764,7 +1764,7 @@
           <a:p>
             <a:fld id="{B22306D6-51C5-4B5A-8820-C27038D71A33}" type="datetimeFigureOut">
               <a:rPr lang="en-US" smtClean="0"/>
-              <a:t>1/12/2016</a:t>
+              <a:t>1/13/2016</a:t>
             </a:fld>
             <a:endParaRPr lang="en-US"/>
           </a:p>
@@ -1882,7 +1882,7 @@
           <a:p>
             <a:fld id="{B22306D6-51C5-4B5A-8820-C27038D71A33}" type="datetimeFigureOut">
               <a:rPr lang="en-US" smtClean="0"/>
-              <a:t>1/12/2016</a:t>
+              <a:t>1/13/2016</a:t>
             </a:fld>
             <a:endParaRPr lang="en-US"/>
           </a:p>
@@ -1977,7 +1977,7 @@
           <a:p>
             <a:fld id="{B22306D6-51C5-4B5A-8820-C27038D71A33}" type="datetimeFigureOut">
               <a:rPr lang="en-US" smtClean="0"/>
-              <a:t>1/12/2016</a:t>
+              <a:t>1/13/2016</a:t>
             </a:fld>
             <a:endParaRPr lang="en-US"/>
           </a:p>
@@ -2254,7 +2254,7 @@
           <a:p>
             <a:fld id="{B22306D6-51C5-4B5A-8820-C27038D71A33}" type="datetimeFigureOut">
               <a:rPr lang="en-US" smtClean="0"/>
-              <a:t>1/12/2016</a:t>
+              <a:t>1/13/2016</a:t>
             </a:fld>
             <a:endParaRPr lang="en-US"/>
           </a:p>
@@ -2507,7 +2507,7 @@
           <a:p>
             <a:fld id="{B22306D6-51C5-4B5A-8820-C27038D71A33}" type="datetimeFigureOut">
               <a:rPr lang="en-US" smtClean="0"/>
-              <a:t>1/12/2016</a:t>
+              <a:t>1/13/2016</a:t>
             </a:fld>
             <a:endParaRPr lang="en-US"/>
           </a:p>
@@ -2720,7 +2720,7 @@
           <a:p>
             <a:fld id="{B22306D6-51C5-4B5A-8820-C27038D71A33}" type="datetimeFigureOut">
               <a:rPr lang="en-US" smtClean="0"/>
-              <a:t>1/12/2016</a:t>
+              <a:t>1/13/2016</a:t>
             </a:fld>
             <a:endParaRPr lang="en-US"/>
           </a:p>
@@ -3097,7 +3097,7 @@
       </p:grpSpPr>
       <p:pic>
         <p:nvPicPr>
-          <p:cNvPr id="4" name="Image 3"/>
+          <p:cNvPr id="21" name="Image 20"/>
           <p:cNvPicPr>
             <a:picLocks noChangeAspect="1"/>
           </p:cNvPicPr>
@@ -3117,8 +3117,8 @@
         </p:blipFill>
         <p:spPr>
           <a:xfrm>
-            <a:off x="1985962" y="500062"/>
-            <a:ext cx="5172075" cy="5857875"/>
+            <a:off x="1428750" y="506476"/>
+            <a:ext cx="6286500" cy="5857875"/>
           </a:xfrm>
           <a:prstGeom prst="rect">
             <a:avLst/>
@@ -3133,7 +3133,7 @@
         </p:nvSpPr>
         <p:spPr>
           <a:xfrm>
-            <a:off x="2159733" y="2348879"/>
+            <a:off x="1655677" y="2348879"/>
             <a:ext cx="1080120" cy="936104"/>
           </a:xfrm>
           <a:prstGeom prst="rect">
@@ -3177,7 +3177,7 @@
         </p:nvSpPr>
         <p:spPr>
           <a:xfrm>
-            <a:off x="4000173" y="2347835"/>
+            <a:off x="3496117" y="2347835"/>
             <a:ext cx="1143653" cy="936104"/>
           </a:xfrm>
           <a:prstGeom prst="rect">
@@ -3221,7 +3221,7 @@
         </p:nvSpPr>
         <p:spPr>
           <a:xfrm>
-            <a:off x="5661557" y="2348880"/>
+            <a:off x="6300192" y="2348880"/>
             <a:ext cx="1258027" cy="936104"/>
           </a:xfrm>
           <a:prstGeom prst="rect">
@@ -3265,7 +3265,7 @@
         </p:nvSpPr>
         <p:spPr>
           <a:xfrm>
-            <a:off x="3104217" y="566428"/>
+            <a:off x="2600161" y="566428"/>
             <a:ext cx="1179749" cy="936104"/>
           </a:xfrm>
           <a:prstGeom prst="rect">
@@ -3309,7 +3309,7 @@
         </p:nvSpPr>
         <p:spPr>
           <a:xfrm>
-            <a:off x="5700695" y="566428"/>
+            <a:off x="6300192" y="566428"/>
             <a:ext cx="1179749" cy="936104"/>
           </a:xfrm>
           <a:prstGeom prst="rect">
@@ -3353,7 +3353,7 @@
         </p:nvSpPr>
         <p:spPr>
           <a:xfrm>
-            <a:off x="3104217" y="5287838"/>
+            <a:off x="2600161" y="5287838"/>
             <a:ext cx="1152126" cy="936104"/>
           </a:xfrm>
           <a:prstGeom prst="rect">
@@ -3397,7 +3397,7 @@
         </p:nvSpPr>
         <p:spPr>
           <a:xfrm>
-            <a:off x="5714506" y="5287839"/>
+            <a:off x="5210450" y="5287839"/>
             <a:ext cx="1152126" cy="936104"/>
           </a:xfrm>
           <a:prstGeom prst="rect">
@@ -3441,7 +3441,7 @@
         </p:nvSpPr>
         <p:spPr>
           <a:xfrm>
-            <a:off x="2051720" y="4050357"/>
+            <a:off x="1547664" y="4050357"/>
             <a:ext cx="1296144" cy="432048"/>
           </a:xfrm>
           <a:prstGeom prst="rect">
@@ -3485,7 +3485,7 @@
         </p:nvSpPr>
         <p:spPr>
           <a:xfrm>
-            <a:off x="3914308" y="4077072"/>
+            <a:off x="3410252" y="4077072"/>
             <a:ext cx="1315382" cy="432048"/>
           </a:xfrm>
           <a:prstGeom prst="rect">
@@ -3529,7 +3529,7 @@
         </p:nvSpPr>
         <p:spPr>
           <a:xfrm>
-            <a:off x="5632881" y="4077072"/>
+            <a:off x="6300192" y="4071380"/>
             <a:ext cx="1315382" cy="432048"/>
           </a:xfrm>
           <a:prstGeom prst="rect">
@@ -3568,15 +3568,12 @@
       <p:cxnSp>
         <p:nvCxnSpPr>
           <p:cNvPr id="18" name="Connecteur en angle 17"/>
-          <p:cNvCxnSpPr>
-            <a:stCxn id="6" idx="0"/>
-            <a:endCxn id="8" idx="2"/>
-          </p:cNvCxnSpPr>
+          <p:cNvCxnSpPr/>
           <p:nvPr/>
         </p:nvCxnSpPr>
         <p:spPr>
           <a:xfrm rot="16200000" flipV="1">
-            <a:off x="3710395" y="1486230"/>
+            <a:off x="3220151" y="1486230"/>
             <a:ext cx="845303" cy="877908"/>
           </a:xfrm>
           <a:prstGeom prst="bentConnector3">
@@ -3605,15 +3602,12 @@
       <p:cxnSp>
         <p:nvCxnSpPr>
           <p:cNvPr id="20" name="Connecteur en angle 19"/>
-          <p:cNvCxnSpPr>
-            <a:stCxn id="5" idx="0"/>
-            <a:endCxn id="8" idx="2"/>
-          </p:cNvCxnSpPr>
+          <p:cNvCxnSpPr/>
           <p:nvPr/>
         </p:nvCxnSpPr>
         <p:spPr>
           <a:xfrm rot="5400000" flipH="1" flipV="1">
-            <a:off x="2773769" y="1428557"/>
+            <a:off x="2283525" y="1428557"/>
             <a:ext cx="846347" cy="994299"/>
           </a:xfrm>
           <a:prstGeom prst="bentConnector3">
@@ -3643,14 +3637,13 @@
         <p:nvCxnSpPr>
           <p:cNvPr id="22" name="Connecteur en angle 21"/>
           <p:cNvCxnSpPr>
-            <a:stCxn id="7" idx="0"/>
             <a:endCxn id="9" idx="2"/>
           </p:cNvCxnSpPr>
           <p:nvPr/>
         </p:nvCxnSpPr>
         <p:spPr>
           <a:xfrm rot="16200000" flipV="1">
-            <a:off x="5867397" y="1925705"/>
+            <a:off x="6466894" y="1925705"/>
             <a:ext cx="846348" cy="1"/>
           </a:xfrm>
           <a:prstGeom prst="bentConnector3">
@@ -3687,7 +3680,7 @@
         </p:nvCxnSpPr>
         <p:spPr>
           <a:xfrm rot="16200000" flipH="1">
-            <a:off x="2787320" y="4394877"/>
+            <a:off x="2283264" y="4394877"/>
             <a:ext cx="805433" cy="980488"/>
           </a:xfrm>
           <a:prstGeom prst="bentConnector3">
@@ -3724,7 +3717,7 @@
         </p:nvCxnSpPr>
         <p:spPr>
           <a:xfrm rot="5400000">
-            <a:off x="3736781" y="4452620"/>
+            <a:off x="3232725" y="4452620"/>
             <a:ext cx="778718" cy="891719"/>
           </a:xfrm>
           <a:prstGeom prst="bentConnector3">
@@ -3755,15 +3748,12 @@
       <p:cxnSp>
         <p:nvCxnSpPr>
           <p:cNvPr id="28" name="Connecteur en angle 27"/>
-          <p:cNvCxnSpPr>
-            <a:stCxn id="14" idx="2"/>
-            <a:endCxn id="11" idx="0"/>
-          </p:cNvCxnSpPr>
+          <p:cNvCxnSpPr/>
           <p:nvPr/>
         </p:nvCxnSpPr>
         <p:spPr>
           <a:xfrm rot="5400000">
-            <a:off x="5901212" y="4898478"/>
+            <a:off x="6500709" y="4898478"/>
             <a:ext cx="778719" cy="3"/>
           </a:xfrm>
           <a:prstGeom prst="bentConnector3">
@@ -3791,126 +3781,13 @@
       </p:cxnSp>
       <p:cxnSp>
         <p:nvCxnSpPr>
-          <p:cNvPr id="33" name="Connecteur en angle 32"/>
-          <p:cNvCxnSpPr>
-            <a:stCxn id="5" idx="2"/>
-            <a:endCxn id="12" idx="0"/>
-          </p:cNvCxnSpPr>
-          <p:nvPr/>
-        </p:nvCxnSpPr>
-        <p:spPr>
-          <a:xfrm rot="5400000">
-            <a:off x="2317106" y="3667670"/>
-            <a:ext cx="765374" cy="1"/>
-          </a:xfrm>
-          <a:prstGeom prst="bentConnector3">
-            <a:avLst/>
-          </a:prstGeom>
-          <a:ln>
-            <a:headEnd type="arrow"/>
-            <a:tailEnd type="arrow"/>
-          </a:ln>
-        </p:spPr>
-        <p:style>
-          <a:lnRef idx="2">
-            <a:schemeClr val="accent2"/>
-          </a:lnRef>
-          <a:fillRef idx="0">
-            <a:schemeClr val="accent2"/>
-          </a:fillRef>
-          <a:effectRef idx="1">
-            <a:schemeClr val="accent2"/>
-          </a:effectRef>
-          <a:fontRef idx="minor">
-            <a:schemeClr val="tx1"/>
-          </a:fontRef>
-        </p:style>
-      </p:cxnSp>
-      <p:cxnSp>
-        <p:nvCxnSpPr>
-          <p:cNvPr id="35" name="Connecteur en angle 34"/>
-          <p:cNvCxnSpPr>
-            <a:stCxn id="6" idx="2"/>
-            <a:endCxn id="13" idx="0"/>
-          </p:cNvCxnSpPr>
-          <p:nvPr/>
-        </p:nvCxnSpPr>
-        <p:spPr>
-          <a:xfrm rot="5400000">
-            <a:off x="4175434" y="3680505"/>
-            <a:ext cx="793133" cy="1"/>
-          </a:xfrm>
-          <a:prstGeom prst="bentConnector3">
-            <a:avLst>
-              <a:gd name="adj1" fmla="val 50000"/>
-            </a:avLst>
-          </a:prstGeom>
-          <a:ln>
-            <a:headEnd type="arrow"/>
-            <a:tailEnd type="arrow"/>
-          </a:ln>
-        </p:spPr>
-        <p:style>
-          <a:lnRef idx="2">
-            <a:schemeClr val="accent2"/>
-          </a:lnRef>
-          <a:fillRef idx="0">
-            <a:schemeClr val="accent2"/>
-          </a:fillRef>
-          <a:effectRef idx="1">
-            <a:schemeClr val="accent2"/>
-          </a:effectRef>
-          <a:fontRef idx="minor">
-            <a:schemeClr val="tx1"/>
-          </a:fontRef>
-        </p:style>
-      </p:cxnSp>
-      <p:cxnSp>
-        <p:nvCxnSpPr>
-          <p:cNvPr id="37" name="Connecteur en angle 36"/>
-          <p:cNvCxnSpPr>
-            <a:stCxn id="7" idx="2"/>
-            <a:endCxn id="14" idx="0"/>
-          </p:cNvCxnSpPr>
-          <p:nvPr/>
-        </p:nvCxnSpPr>
-        <p:spPr>
-          <a:xfrm rot="16200000" flipH="1">
-            <a:off x="5894527" y="3681027"/>
-            <a:ext cx="792088" cy="1"/>
-          </a:xfrm>
-          <a:prstGeom prst="bentConnector3">
-            <a:avLst/>
-          </a:prstGeom>
-          <a:ln>
-            <a:headEnd type="arrow"/>
-            <a:tailEnd type="arrow"/>
-          </a:ln>
-        </p:spPr>
-        <p:style>
-          <a:lnRef idx="2">
-            <a:schemeClr val="accent2"/>
-          </a:lnRef>
-          <a:fillRef idx="0">
-            <a:schemeClr val="accent2"/>
-          </a:fillRef>
-          <a:effectRef idx="1">
-            <a:schemeClr val="accent2"/>
-          </a:effectRef>
-          <a:fontRef idx="minor">
-            <a:schemeClr val="tx1"/>
-          </a:fontRef>
-        </p:style>
-      </p:cxnSp>
-      <p:cxnSp>
-        <p:nvCxnSpPr>
           <p:cNvPr id="128" name="Connecteur droit avec flèche 127"/>
           <p:cNvCxnSpPr/>
           <p:nvPr/>
         </p:nvCxnSpPr>
         <p:spPr>
           <a:xfrm>
-            <a:off x="497124" y="556184"/>
+            <a:off x="251520" y="1060240"/>
             <a:ext cx="648072" cy="0"/>
           </a:xfrm>
           <a:prstGeom prst="straightConnector1">
@@ -3936,16 +3813,246 @@
           </a:fontRef>
         </p:style>
       </p:cxnSp>
+      <p:sp>
+        <p:nvSpPr>
+          <p:cNvPr id="132" name="ZoneTexte 131"/>
+          <p:cNvSpPr txBox="1"/>
+          <p:nvPr/>
+        </p:nvSpPr>
+        <p:spPr>
+          <a:xfrm>
+            <a:off x="899592" y="836712"/>
+            <a:ext cx="1331839" cy="369332"/>
+          </a:xfrm>
+          <a:prstGeom prst="rect">
+            <a:avLst/>
+          </a:prstGeom>
+          <a:noFill/>
+        </p:spPr>
+        <p:txBody>
+          <a:bodyPr wrap="none" rtlCol="0">
+            <a:spAutoFit/>
+          </a:bodyPr>
+          <a:lstStyle/>
+          <a:p>
+            <a:r>
+              <a:rPr lang="en-US" dirty="0" smtClean="0"/>
+              <a:t>: Instance of</a:t>
+            </a:r>
+            <a:endParaRPr lang="en-US" dirty="0"/>
+          </a:p>
+        </p:txBody>
+      </p:sp>
       <p:cxnSp>
         <p:nvCxnSpPr>
-          <p:cNvPr id="130" name="Connecteur droit avec flèche 129"/>
+          <p:cNvPr id="3" name="Connecteur droit avec flèche 2"/>
+          <p:cNvCxnSpPr>
+            <a:stCxn id="12" idx="0"/>
+          </p:cNvCxnSpPr>
+          <p:nvPr/>
+        </p:nvCxnSpPr>
+        <p:spPr>
+          <a:xfrm flipV="1">
+            <a:off x="2195736" y="3283939"/>
+            <a:ext cx="1" cy="766418"/>
+          </a:xfrm>
+          <a:prstGeom prst="straightConnector1">
+            <a:avLst/>
+          </a:prstGeom>
+          <a:ln>
+            <a:solidFill>
+              <a:schemeClr val="tx1"/>
+            </a:solidFill>
+            <a:tailEnd type="arrow"/>
+          </a:ln>
+        </p:spPr>
+        <p:style>
+          <a:lnRef idx="1">
+            <a:schemeClr val="accent1"/>
+          </a:lnRef>
+          <a:fillRef idx="0">
+            <a:schemeClr val="accent1"/>
+          </a:fillRef>
+          <a:effectRef idx="0">
+            <a:schemeClr val="accent1"/>
+          </a:effectRef>
+          <a:fontRef idx="minor">
+            <a:schemeClr val="tx1"/>
+          </a:fontRef>
+        </p:style>
+      </p:cxnSp>
+      <p:cxnSp>
+        <p:nvCxnSpPr>
+          <p:cNvPr id="29" name="Connecteur droit avec flèche 28"/>
           <p:cNvCxnSpPr/>
           <p:nvPr/>
         </p:nvCxnSpPr>
         <p:spPr>
+          <a:xfrm flipV="1">
+            <a:off x="4067942" y="3304962"/>
+            <a:ext cx="1" cy="766418"/>
+          </a:xfrm>
+          <a:prstGeom prst="straightConnector1">
+            <a:avLst/>
+          </a:prstGeom>
+          <a:ln>
+            <a:solidFill>
+              <a:schemeClr val="tx1"/>
+            </a:solidFill>
+            <a:tailEnd type="arrow"/>
+          </a:ln>
+        </p:spPr>
+        <p:style>
+          <a:lnRef idx="1">
+            <a:schemeClr val="accent1"/>
+          </a:lnRef>
+          <a:fillRef idx="0">
+            <a:schemeClr val="accent1"/>
+          </a:fillRef>
+          <a:effectRef idx="0">
+            <a:schemeClr val="accent1"/>
+          </a:effectRef>
+          <a:fontRef idx="minor">
+            <a:schemeClr val="tx1"/>
+          </a:fontRef>
+        </p:style>
+      </p:cxnSp>
+      <p:cxnSp>
+        <p:nvCxnSpPr>
+          <p:cNvPr id="30" name="Connecteur droit avec flèche 29"/>
+          <p:cNvCxnSpPr/>
+          <p:nvPr/>
+        </p:nvCxnSpPr>
+        <p:spPr>
+          <a:xfrm flipV="1">
+            <a:off x="6897688" y="3283939"/>
+            <a:ext cx="1" cy="766418"/>
+          </a:xfrm>
+          <a:prstGeom prst="straightConnector1">
+            <a:avLst/>
+          </a:prstGeom>
+          <a:ln>
+            <a:solidFill>
+              <a:schemeClr val="tx1"/>
+            </a:solidFill>
+            <a:tailEnd type="arrow"/>
+          </a:ln>
+        </p:spPr>
+        <p:style>
+          <a:lnRef idx="1">
+            <a:schemeClr val="accent1"/>
+          </a:lnRef>
+          <a:fillRef idx="0">
+            <a:schemeClr val="accent1"/>
+          </a:fillRef>
+          <a:effectRef idx="0">
+            <a:schemeClr val="accent1"/>
+          </a:effectRef>
+          <a:fontRef idx="minor">
+            <a:schemeClr val="tx1"/>
+          </a:fontRef>
+        </p:style>
+      </p:cxnSp>
+      <p:sp>
+        <p:nvSpPr>
+          <p:cNvPr id="15" name="ZoneTexte 14"/>
+          <p:cNvSpPr txBox="1"/>
+          <p:nvPr/>
+        </p:nvSpPr>
+        <p:spPr>
           <a:xfrm>
-            <a:off x="497124" y="908720"/>
-            <a:ext cx="648072" cy="0"/>
+            <a:off x="2184653" y="3319998"/>
+            <a:ext cx="659155" cy="230832"/>
+          </a:xfrm>
+          <a:prstGeom prst="rect">
+            <a:avLst/>
+          </a:prstGeom>
+          <a:noFill/>
+        </p:spPr>
+        <p:txBody>
+          <a:bodyPr wrap="none" rtlCol="0">
+            <a:spAutoFit/>
+          </a:bodyPr>
+          <a:lstStyle/>
+          <a:p>
+            <a:r>
+              <a:rPr lang="en-US" sz="900" dirty="0" smtClean="0"/>
+              <a:t>[0..*]roles</a:t>
+            </a:r>
+            <a:endParaRPr lang="en-US" sz="900" dirty="0"/>
+          </a:p>
+        </p:txBody>
+      </p:sp>
+      <p:sp>
+        <p:nvSpPr>
+          <p:cNvPr id="31" name="ZoneTexte 30"/>
+          <p:cNvSpPr txBox="1"/>
+          <p:nvPr/>
+        </p:nvSpPr>
+        <p:spPr>
+          <a:xfrm>
+            <a:off x="4081757" y="3313583"/>
+            <a:ext cx="659155" cy="230832"/>
+          </a:xfrm>
+          <a:prstGeom prst="rect">
+            <a:avLst/>
+          </a:prstGeom>
+          <a:noFill/>
+        </p:spPr>
+        <p:txBody>
+          <a:bodyPr wrap="none" rtlCol="0">
+            <a:spAutoFit/>
+          </a:bodyPr>
+          <a:lstStyle/>
+          <a:p>
+            <a:r>
+              <a:rPr lang="en-US" sz="900" dirty="0" smtClean="0"/>
+              <a:t>[0..*]roles</a:t>
+            </a:r>
+            <a:endParaRPr lang="en-US" sz="900" dirty="0"/>
+          </a:p>
+        </p:txBody>
+      </p:sp>
+      <p:sp>
+        <p:nvSpPr>
+          <p:cNvPr id="32" name="ZoneTexte 31"/>
+          <p:cNvSpPr txBox="1"/>
+          <p:nvPr/>
+        </p:nvSpPr>
+        <p:spPr>
+          <a:xfrm>
+            <a:off x="6913835" y="3283939"/>
+            <a:ext cx="659155" cy="230832"/>
+          </a:xfrm>
+          <a:prstGeom prst="rect">
+            <a:avLst/>
+          </a:prstGeom>
+          <a:noFill/>
+        </p:spPr>
+        <p:txBody>
+          <a:bodyPr wrap="none" rtlCol="0">
+            <a:spAutoFit/>
+          </a:bodyPr>
+          <a:lstStyle/>
+          <a:p>
+            <a:r>
+              <a:rPr lang="en-US" sz="900" dirty="0" smtClean="0"/>
+              <a:t>[0..*]roles</a:t>
+            </a:r>
+            <a:endParaRPr lang="en-US" sz="900" dirty="0"/>
+          </a:p>
+        </p:txBody>
+      </p:sp>
+      <p:cxnSp>
+        <p:nvCxnSpPr>
+          <p:cNvPr id="17" name="Connecteur droit avec flèche 16"/>
+          <p:cNvCxnSpPr/>
+          <p:nvPr/>
+        </p:nvCxnSpPr>
+        <p:spPr>
+          <a:xfrm>
+            <a:off x="4572000" y="2852936"/>
+            <a:ext cx="1728192" cy="0"/>
           </a:xfrm>
           <a:prstGeom prst="straightConnector1">
             <a:avLst/>
@@ -3957,13 +4064,13 @@
         </p:spPr>
         <p:style>
           <a:lnRef idx="2">
-            <a:schemeClr val="accent2"/>
+            <a:schemeClr val="dk1"/>
           </a:lnRef>
           <a:fillRef idx="0">
-            <a:schemeClr val="accent2"/>
+            <a:schemeClr val="dk1"/>
           </a:fillRef>
           <a:effectRef idx="1">
-            <a:schemeClr val="accent2"/>
+            <a:schemeClr val="dk1"/>
           </a:effectRef>
           <a:fontRef idx="minor">
             <a:schemeClr val="tx1"/>
@@ -3972,14 +4079,14 @@
       </p:cxnSp>
       <p:sp>
         <p:nvSpPr>
-          <p:cNvPr id="132" name="ZoneTexte 131"/>
+          <p:cNvPr id="19" name="ZoneTexte 18"/>
           <p:cNvSpPr txBox="1"/>
           <p:nvPr/>
         </p:nvSpPr>
         <p:spPr>
           <a:xfrm>
-            <a:off x="1145196" y="332656"/>
-            <a:ext cx="1331839" cy="369332"/>
+            <a:off x="4905258" y="2560325"/>
+            <a:ext cx="1431802" cy="261610"/>
           </a:xfrm>
           <a:prstGeom prst="rect">
             <a:avLst/>
@@ -3993,23 +4100,27 @@
           <a:lstStyle/>
           <a:p>
             <a:r>
-              <a:rPr lang="en-US" dirty="0" smtClean="0"/>
-              <a:t>: Instance of</a:t>
-            </a:r>
-            <a:endParaRPr lang="en-US" dirty="0"/>
-          </a:p>
-        </p:txBody>
-      </p:sp>
-      <p:sp>
-        <p:nvSpPr>
-          <p:cNvPr id="133" name="ZoneTexte 132"/>
+              <a:rPr lang="en-US" sz="1100" b="1" dirty="0" smtClean="0"/>
+              <a:t>[0..*] </a:t>
+            </a:r>
+            <a:r>
+              <a:rPr lang="en-US" sz="1100" b="1" dirty="0" err="1" smtClean="0"/>
+              <a:t>containedRoles</a:t>
+            </a:r>
+            <a:endParaRPr lang="en-US" sz="1100" b="1" dirty="0"/>
+          </a:p>
+        </p:txBody>
+      </p:sp>
+      <p:sp>
+        <p:nvSpPr>
+          <p:cNvPr id="38" name="ZoneTexte 37"/>
           <p:cNvSpPr txBox="1"/>
           <p:nvPr/>
         </p:nvSpPr>
         <p:spPr>
           <a:xfrm>
-            <a:off x="1145196" y="683404"/>
-            <a:ext cx="1665008" cy="369332"/>
+            <a:off x="4508350" y="2861826"/>
+            <a:ext cx="1431802" cy="261610"/>
           </a:xfrm>
           <a:prstGeom prst="rect">
             <a:avLst/>
@@ -4023,10 +4134,14 @@
           <a:lstStyle/>
           <a:p>
             <a:r>
-              <a:rPr lang="en-US" dirty="0" smtClean="0"/>
-              <a:t>: “play” relation</a:t>
-            </a:r>
-            <a:endParaRPr lang="en-US" dirty="0"/>
+              <a:rPr lang="en-US" sz="1100" b="1" dirty="0" smtClean="0"/>
+              <a:t>[0..*] </a:t>
+            </a:r>
+            <a:r>
+              <a:rPr lang="en-US" sz="1100" b="1" dirty="0" err="1" smtClean="0"/>
+              <a:t>containedRoles</a:t>
+            </a:r>
+            <a:endParaRPr lang="en-US" sz="1100" b="1" dirty="0"/>
           </a:p>
         </p:txBody>
       </p:sp>
@@ -4040,6 +4155,13 @@
   <p:clrMapOvr>
     <a:masterClrMapping/>
   </p:clrMapOvr>
+  <p:timing>
+    <p:tnLst>
+      <p:par>
+        <p:cTn id="1" dur="indefinite" restart="never" nodeType="tmRoot"/>
+      </p:par>
+    </p:tnLst>
+  </p:timing>
 </p:sld>
 </file>
 

</xml_diff>